<commit_message>
Update some part in the Slides
</commit_message>
<xml_diff>
--- a/Kalman Filter/Kalman Filters_Slide.pptx
+++ b/Kalman Filter/Kalman Filters_Slide.pptx
@@ -5,7 +5,7 @@
     <p:sldMasterId id="2147483660" r:id="rId1"/>
   </p:sldMasterIdLst>
   <p:handoutMasterIdLst>
-    <p:handoutMasterId r:id="rId32"/>
+    <p:handoutMasterId r:id="rId33"/>
   </p:handoutMasterIdLst>
   <p:sldIdLst>
     <p:sldId id="502" r:id="rId2"/>
@@ -38,6 +38,7 @@
     <p:sldId id="522" r:id="rId29"/>
     <p:sldId id="523" r:id="rId30"/>
     <p:sldId id="524" r:id="rId31"/>
+    <p:sldId id="528" r:id="rId32"/>
   </p:sldIdLst>
   <p:sldSz cx="12192000" cy="6858000"/>
   <p:notesSz cx="6858000" cy="9144000"/>
@@ -15546,6 +15547,519 @@
     <p:extLst>
       <p:ext uri="{BB962C8B-B14F-4D97-AF65-F5344CB8AC3E}">
         <p14:creationId xmlns:p14="http://schemas.microsoft.com/office/powerpoint/2010/main" val="2013530272"/>
+      </p:ext>
+    </p:extLst>
+  </p:cSld>
+  <p:clrMapOvr>
+    <a:masterClrMapping/>
+  </p:clrMapOvr>
+</p:sld>
+</file>
+
+<file path=ppt/slides/slide31.xml><?xml version="1.0" encoding="utf-8"?>
+<p:sld xmlns:a="http://schemas.openxmlformats.org/drawingml/2006/main" xmlns:r="http://schemas.openxmlformats.org/officeDocument/2006/relationships" xmlns:p="http://schemas.openxmlformats.org/presentationml/2006/main">
+  <p:cSld>
+    <p:spTree>
+      <p:nvGrpSpPr>
+        <p:cNvPr id="1" name=""/>
+        <p:cNvGrpSpPr/>
+        <p:nvPr/>
+      </p:nvGrpSpPr>
+      <p:grpSpPr>
+        <a:xfrm>
+          <a:off x="0" y="0"/>
+          <a:ext cx="0" cy="0"/>
+          <a:chOff x="0" y="0"/>
+          <a:chExt cx="0" cy="0"/>
+        </a:xfrm>
+      </p:grpSpPr>
+      <p:sp>
+        <p:nvSpPr>
+          <p:cNvPr id="2" name="灯片编号占位符 1">
+            <a:extLst>
+              <a:ext uri="{FF2B5EF4-FFF2-40B4-BE49-F238E27FC236}">
+                <a16:creationId xmlns:a16="http://schemas.microsoft.com/office/drawing/2014/main" id="{DA2BF8FB-6B2C-560B-C4A0-144BF053CB9D}"/>
+              </a:ext>
+            </a:extLst>
+          </p:cNvPr>
+          <p:cNvSpPr>
+            <a:spLocks noGrp="1"/>
+          </p:cNvSpPr>
+          <p:nvPr>
+            <p:ph type="sldNum" sz="quarter" idx="12"/>
+          </p:nvPr>
+        </p:nvSpPr>
+        <p:spPr/>
+        <p:txBody>
+          <a:bodyPr/>
+          <a:lstStyle/>
+          <a:p>
+            <a:fld id="{565CE74E-AB26-4998-AD42-012C4C1AD076}" type="slidenum">
+              <a:rPr lang="zh-CN" altLang="en-US" smtClean="0"/>
+              <a:t>31</a:t>
+            </a:fld>
+            <a:endParaRPr lang="zh-CN" altLang="en-US"/>
+          </a:p>
+        </p:txBody>
+      </p:sp>
+      <p:sp>
+        <p:nvSpPr>
+          <p:cNvPr id="3" name="矩形 2">
+            <a:extLst>
+              <a:ext uri="{FF2B5EF4-FFF2-40B4-BE49-F238E27FC236}">
+                <a16:creationId xmlns:a16="http://schemas.microsoft.com/office/drawing/2014/main" id="{FC952209-A012-C1C8-9CEC-D6AB774D39E3}"/>
+              </a:ext>
+            </a:extLst>
+          </p:cNvPr>
+          <p:cNvSpPr/>
+          <p:nvPr/>
+        </p:nvSpPr>
+        <p:spPr>
+          <a:xfrm>
+            <a:off x="1" y="-2"/>
+            <a:ext cx="220551" cy="6858002"/>
+          </a:xfrm>
+          <a:prstGeom prst="rect">
+            <a:avLst/>
+          </a:prstGeom>
+          <a:gradFill>
+            <a:gsLst>
+              <a:gs pos="100000">
+                <a:srgbClr val="1C2F43"/>
+              </a:gs>
+              <a:gs pos="0">
+                <a:srgbClr val="46706E"/>
+              </a:gs>
+            </a:gsLst>
+            <a:lin ang="5400000" scaled="1"/>
+          </a:gradFill>
+          <a:ln>
+            <a:noFill/>
+          </a:ln>
+        </p:spPr>
+        <p:style>
+          <a:lnRef idx="2">
+            <a:schemeClr val="accent1">
+              <a:shade val="50000"/>
+            </a:schemeClr>
+          </a:lnRef>
+          <a:fillRef idx="1">
+            <a:schemeClr val="accent1"/>
+          </a:fillRef>
+          <a:effectRef idx="0">
+            <a:schemeClr val="accent1"/>
+          </a:effectRef>
+          <a:fontRef idx="minor">
+            <a:schemeClr val="lt1"/>
+          </a:fontRef>
+        </p:style>
+        <p:txBody>
+          <a:bodyPr rtlCol="0" anchor="ctr"/>
+          <a:lstStyle/>
+          <a:p>
+            <a:pPr marL="0" marR="0" lvl="0" indent="0" algn="ctr" defTabSz="914400" rtl="0" eaLnBrk="1" fontAlgn="auto" latinLnBrk="0" hangingPunct="1">
+              <a:lnSpc>
+                <a:spcPct val="100000"/>
+              </a:lnSpc>
+              <a:spcBef>
+                <a:spcPts val="0"/>
+              </a:spcBef>
+              <a:spcAft>
+                <a:spcPts val="0"/>
+              </a:spcAft>
+              <a:buClrTx/>
+              <a:buSzTx/>
+              <a:buFontTx/>
+              <a:buNone/>
+              <a:tabLst/>
+              <a:defRPr/>
+            </a:pPr>
+            <a:endParaRPr kumimoji="0" lang="zh-CN" altLang="en-US" sz="1800" b="0" i="0" u="none" strike="noStrike" kern="1200" cap="none" spc="0" normalizeH="0" baseline="0" noProof="0">
+              <a:ln>
+                <a:noFill/>
+              </a:ln>
+              <a:solidFill>
+                <a:prstClr val="white"/>
+              </a:solidFill>
+              <a:effectLst/>
+              <a:uLnTx/>
+              <a:uFillTx/>
+              <a:latin typeface="Calibri"/>
+              <a:ea typeface="微软雅黑" panose="020B0503020204020204" pitchFamily="34" charset="-122"/>
+              <a:cs typeface="+mn-cs"/>
+            </a:endParaRPr>
+          </a:p>
+        </p:txBody>
+      </p:sp>
+      <p:pic>
+        <p:nvPicPr>
+          <p:cNvPr id="4" name="图片 3">
+            <a:extLst>
+              <a:ext uri="{FF2B5EF4-FFF2-40B4-BE49-F238E27FC236}">
+                <a16:creationId xmlns:a16="http://schemas.microsoft.com/office/drawing/2014/main" id="{52F6BA3C-4E7F-B5FB-0705-F22DC0CB06D7}"/>
+              </a:ext>
+            </a:extLst>
+          </p:cNvPr>
+          <p:cNvPicPr>
+            <a:picLocks noChangeAspect="1"/>
+          </p:cNvPicPr>
+          <p:nvPr/>
+        </p:nvPicPr>
+        <p:blipFill>
+          <a:blip r:embed="rId2"/>
+          <a:stretch>
+            <a:fillRect/>
+          </a:stretch>
+        </p:blipFill>
+        <p:spPr>
+          <a:xfrm>
+            <a:off x="11265327" y="-2"/>
+            <a:ext cx="926672" cy="926672"/>
+          </a:xfrm>
+          <a:prstGeom prst="rect">
+            <a:avLst/>
+          </a:prstGeom>
+        </p:spPr>
+      </p:pic>
+      <p:pic>
+        <p:nvPicPr>
+          <p:cNvPr id="7" name="图片 6">
+            <a:extLst>
+              <a:ext uri="{FF2B5EF4-FFF2-40B4-BE49-F238E27FC236}">
+                <a16:creationId xmlns:a16="http://schemas.microsoft.com/office/drawing/2014/main" id="{2386AB5B-DEFA-3E86-238F-417388F3CE80}"/>
+              </a:ext>
+            </a:extLst>
+          </p:cNvPr>
+          <p:cNvPicPr>
+            <a:picLocks noChangeAspect="1"/>
+          </p:cNvPicPr>
+          <p:nvPr/>
+        </p:nvPicPr>
+        <p:blipFill>
+          <a:blip r:embed="rId3"/>
+          <a:stretch>
+            <a:fillRect/>
+          </a:stretch>
+        </p:blipFill>
+        <p:spPr>
+          <a:xfrm>
+            <a:off x="485347" y="243859"/>
+            <a:ext cx="219475" cy="219475"/>
+          </a:xfrm>
+          <a:prstGeom prst="rect">
+            <a:avLst/>
+          </a:prstGeom>
+        </p:spPr>
+      </p:pic>
+      <p:sp>
+        <p:nvSpPr>
+          <p:cNvPr id="9" name="文本框 8">
+            <a:extLst>
+              <a:ext uri="{FF2B5EF4-FFF2-40B4-BE49-F238E27FC236}">
+                <a16:creationId xmlns:a16="http://schemas.microsoft.com/office/drawing/2014/main" id="{8CE9196C-B4E8-07DD-ADAA-F3AE6D97CFA1}"/>
+              </a:ext>
+            </a:extLst>
+          </p:cNvPr>
+          <p:cNvSpPr txBox="1"/>
+          <p:nvPr/>
+        </p:nvSpPr>
+        <p:spPr>
+          <a:xfrm>
+            <a:off x="886018" y="153541"/>
+            <a:ext cx="6096000" cy="400110"/>
+          </a:xfrm>
+          <a:prstGeom prst="rect">
+            <a:avLst/>
+          </a:prstGeom>
+          <a:noFill/>
+        </p:spPr>
+        <p:txBody>
+          <a:bodyPr wrap="square">
+            <a:spAutoFit/>
+          </a:bodyPr>
+          <a:lstStyle/>
+          <a:p>
+            <a:pPr marL="0" marR="0" lvl="0" indent="0" algn="l" defTabSz="914400" rtl="0" eaLnBrk="1" fontAlgn="auto" latinLnBrk="0" hangingPunct="1">
+              <a:lnSpc>
+                <a:spcPct val="100000"/>
+              </a:lnSpc>
+              <a:spcBef>
+                <a:spcPts val="0"/>
+              </a:spcBef>
+              <a:spcAft>
+                <a:spcPts val="0"/>
+              </a:spcAft>
+              <a:buClrTx/>
+              <a:buSzTx/>
+              <a:buFontTx/>
+              <a:buNone/>
+              <a:tabLst/>
+              <a:defRPr/>
+            </a:pPr>
+            <a:r>
+              <a:rPr lang="en-US" altLang="zh-CN" sz="2000" b="1" dirty="0">
+                <a:solidFill>
+                  <a:prstClr val="black"/>
+                </a:solidFill>
+                <a:latin typeface="Times New Roman" panose="02020603050405020304" pitchFamily="18" charset="0"/>
+                <a:ea typeface="微软雅黑" panose="020B0503020204020204" pitchFamily="34" charset="-122"/>
+                <a:cs typeface="Times New Roman" panose="02020603050405020304" pitchFamily="18" charset="0"/>
+              </a:rPr>
+              <a:t>Reference</a:t>
+            </a:r>
+            <a:endParaRPr kumimoji="0" lang="zh-CN" altLang="en-US" sz="2000" b="1" i="0" u="none" strike="noStrike" kern="1200" cap="none" spc="0" normalizeH="0" baseline="0" noProof="0" dirty="0">
+              <a:ln>
+                <a:noFill/>
+              </a:ln>
+              <a:solidFill>
+                <a:prstClr val="black"/>
+              </a:solidFill>
+              <a:effectLst/>
+              <a:uLnTx/>
+              <a:uFillTx/>
+              <a:latin typeface="Times New Roman" panose="02020603050405020304" pitchFamily="18" charset="0"/>
+              <a:ea typeface="微软雅黑" panose="020B0503020204020204" pitchFamily="34" charset="-122"/>
+              <a:cs typeface="Times New Roman" panose="02020603050405020304" pitchFamily="18" charset="0"/>
+            </a:endParaRPr>
+          </a:p>
+        </p:txBody>
+      </p:sp>
+      <p:sp>
+        <p:nvSpPr>
+          <p:cNvPr id="11" name="文本框 10">
+            <a:extLst>
+              <a:ext uri="{FF2B5EF4-FFF2-40B4-BE49-F238E27FC236}">
+                <a16:creationId xmlns:a16="http://schemas.microsoft.com/office/drawing/2014/main" id="{166C8F8B-3FC3-15A9-4FAD-8E4B84D5755F}"/>
+              </a:ext>
+            </a:extLst>
+          </p:cNvPr>
+          <p:cNvSpPr txBox="1"/>
+          <p:nvPr/>
+        </p:nvSpPr>
+        <p:spPr>
+          <a:xfrm>
+            <a:off x="934279" y="5133590"/>
+            <a:ext cx="7277321" cy="646331"/>
+          </a:xfrm>
+          <a:prstGeom prst="rect">
+            <a:avLst/>
+          </a:prstGeom>
+          <a:noFill/>
+        </p:spPr>
+        <p:txBody>
+          <a:bodyPr wrap="square">
+            <a:spAutoFit/>
+          </a:bodyPr>
+          <a:lstStyle/>
+          <a:p>
+            <a:pPr marL="285750" indent="-285750">
+              <a:buFont typeface="Arial" panose="020B0604020202020204" pitchFamily="34" charset="0"/>
+              <a:buChar char="•"/>
+            </a:pPr>
+            <a:r>
+              <a:rPr lang="en-US" altLang="zh-CN" dirty="0">
+                <a:effectLst/>
+              </a:rPr>
+              <a:t>STC Lecture series an introduction to the Kalman filter. (n.d.). </a:t>
+            </a:r>
+            <a:r>
+              <a:rPr lang="en-US" altLang="zh-CN" dirty="0">
+                <a:effectLst/>
+                <a:hlinkClick r:id="rId4"/>
+              </a:rPr>
+              <a:t>https://www.cs.unc.edu/~welch/media/pdf/kalmanIntroSlides.pdf </a:t>
+            </a:r>
+            <a:endParaRPr lang="en-US" altLang="zh-CN" dirty="0">
+              <a:effectLst/>
+            </a:endParaRPr>
+          </a:p>
+        </p:txBody>
+      </p:sp>
+      <p:sp>
+        <p:nvSpPr>
+          <p:cNvPr id="13" name="文本框 12">
+            <a:hlinkClick r:id="rId5"/>
+            <a:extLst>
+              <a:ext uri="{FF2B5EF4-FFF2-40B4-BE49-F238E27FC236}">
+                <a16:creationId xmlns:a16="http://schemas.microsoft.com/office/drawing/2014/main" id="{632CD6DA-8B86-8131-E3BD-DFAB8578564D}"/>
+              </a:ext>
+            </a:extLst>
+          </p:cNvPr>
+          <p:cNvSpPr txBox="1"/>
+          <p:nvPr/>
+        </p:nvSpPr>
+        <p:spPr>
+          <a:xfrm>
+            <a:off x="886017" y="897692"/>
+            <a:ext cx="7091791" cy="646331"/>
+          </a:xfrm>
+          <a:prstGeom prst="rect">
+            <a:avLst/>
+          </a:prstGeom>
+          <a:noFill/>
+        </p:spPr>
+        <p:txBody>
+          <a:bodyPr wrap="square">
+            <a:spAutoFit/>
+          </a:bodyPr>
+          <a:lstStyle/>
+          <a:p>
+            <a:pPr marL="285750" indent="-285750">
+              <a:buFont typeface="Arial" panose="020B0604020202020204" pitchFamily="34" charset="0"/>
+              <a:buChar char="•"/>
+            </a:pPr>
+            <a:r>
+              <a:rPr lang="en-US" altLang="zh-CN" dirty="0">
+                <a:effectLst/>
+              </a:rPr>
+              <a:t>Babb, T. (n.d.). How a Kalman filter works, in pictures. </a:t>
+            </a:r>
+            <a:r>
+              <a:rPr lang="en-US" altLang="zh-CN" i="1" dirty="0" err="1">
+                <a:effectLst/>
+              </a:rPr>
+              <a:t>Bzarg</a:t>
+            </a:r>
+            <a:r>
+              <a:rPr lang="en-US" altLang="zh-CN" dirty="0">
+                <a:effectLst/>
+              </a:rPr>
+              <a:t>. </a:t>
+            </a:r>
+            <a:r>
+              <a:rPr lang="en-US" altLang="zh-CN" dirty="0">
+                <a:effectLst/>
+                <a:hlinkClick r:id="rId5"/>
+              </a:rPr>
+              <a:t>https://www.bzarg.com/p/how-a-kalman-filter-works-in-pictures/ </a:t>
+            </a:r>
+            <a:endParaRPr lang="en-US" altLang="zh-CN" dirty="0">
+              <a:effectLst/>
+            </a:endParaRPr>
+          </a:p>
+        </p:txBody>
+      </p:sp>
+      <p:sp>
+        <p:nvSpPr>
+          <p:cNvPr id="15" name="文本框 14">
+            <a:extLst>
+              <a:ext uri="{FF2B5EF4-FFF2-40B4-BE49-F238E27FC236}">
+                <a16:creationId xmlns:a16="http://schemas.microsoft.com/office/drawing/2014/main" id="{9DFC8385-A7CC-983E-4A17-A4F0292001DD}"/>
+              </a:ext>
+            </a:extLst>
+          </p:cNvPr>
+          <p:cNvSpPr txBox="1"/>
+          <p:nvPr/>
+        </p:nvSpPr>
+        <p:spPr>
+          <a:xfrm>
+            <a:off x="934279" y="1998056"/>
+            <a:ext cx="7277321" cy="1754326"/>
+          </a:xfrm>
+          <a:prstGeom prst="rect">
+            <a:avLst/>
+          </a:prstGeom>
+          <a:noFill/>
+        </p:spPr>
+        <p:txBody>
+          <a:bodyPr wrap="square">
+            <a:spAutoFit/>
+          </a:bodyPr>
+          <a:lstStyle/>
+          <a:p>
+            <a:pPr marL="285750" indent="-285750">
+              <a:buFont typeface="Arial" panose="020B0604020202020204" pitchFamily="34" charset="0"/>
+              <a:buChar char="•"/>
+            </a:pPr>
+            <a:r>
+              <a:rPr lang="en-US" altLang="zh-CN" dirty="0"/>
+              <a:t>“State Estimation and Localization for Self-Driving Cars” launched by the University of Toronto on Coursera. </a:t>
+            </a:r>
+            <a:r>
+              <a:rPr lang="en-US" altLang="zh-CN" dirty="0">
+                <a:hlinkClick r:id="rId6"/>
+              </a:rPr>
+              <a:t>https://www.coursera.org/learn/state-estimation-localization-self-driving-cars/home/week/2</a:t>
+            </a:r>
+            <a:endParaRPr lang="en-US" altLang="zh-CN" dirty="0"/>
+          </a:p>
+          <a:p>
+            <a:pPr marL="285750" indent="-285750">
+              <a:buFont typeface="Arial" panose="020B0604020202020204" pitchFamily="34" charset="0"/>
+              <a:buChar char="•"/>
+            </a:pPr>
+            <a:endParaRPr lang="en-US" altLang="zh-CN" dirty="0"/>
+          </a:p>
+          <a:p>
+            <a:pPr marL="285750" indent="-285750">
+              <a:buFont typeface="Arial" panose="020B0604020202020204" pitchFamily="34" charset="0"/>
+              <a:buChar char="•"/>
+            </a:pPr>
+            <a:endParaRPr lang="en-US" altLang="zh-CN" dirty="0"/>
+          </a:p>
+        </p:txBody>
+      </p:sp>
+      <p:sp>
+        <p:nvSpPr>
+          <p:cNvPr id="17" name="文本框 16">
+            <a:extLst>
+              <a:ext uri="{FF2B5EF4-FFF2-40B4-BE49-F238E27FC236}">
+                <a16:creationId xmlns:a16="http://schemas.microsoft.com/office/drawing/2014/main" id="{752AD643-CF10-103E-AF4B-8267A35731BC}"/>
+              </a:ext>
+            </a:extLst>
+          </p:cNvPr>
+          <p:cNvSpPr txBox="1"/>
+          <p:nvPr/>
+        </p:nvSpPr>
+        <p:spPr>
+          <a:xfrm>
+            <a:off x="934279" y="3532382"/>
+            <a:ext cx="6539947" cy="1200329"/>
+          </a:xfrm>
+          <a:prstGeom prst="rect">
+            <a:avLst/>
+          </a:prstGeom>
+          <a:noFill/>
+        </p:spPr>
+        <p:txBody>
+          <a:bodyPr wrap="square">
+            <a:spAutoFit/>
+          </a:bodyPr>
+          <a:lstStyle/>
+          <a:p>
+            <a:pPr marL="285750" indent="-285750">
+              <a:buFont typeface="Arial" panose="020B0604020202020204" pitchFamily="34" charset="0"/>
+              <a:buChar char="•"/>
+            </a:pPr>
+            <a:r>
+              <a:rPr lang="en-US" altLang="zh-CN" i="1" dirty="0">
+                <a:effectLst/>
+              </a:rPr>
+              <a:t>Understanding Kalman filters, part 3: Optimal State Estimator</a:t>
+            </a:r>
+            <a:r>
+              <a:rPr lang="en-US" altLang="zh-CN" dirty="0">
+                <a:effectLst/>
+              </a:rPr>
+              <a:t>. MATLAB. (n.d.). </a:t>
+            </a:r>
+            <a:r>
+              <a:rPr lang="en-US" altLang="zh-CN" dirty="0">
+                <a:effectLst/>
+                <a:hlinkClick r:id="rId7"/>
+              </a:rPr>
+              <a:t>https://ww2.mathworks.cn/videos/understanding-kalman-filters-part-3-optimal-state-estimator--1490710645421.html </a:t>
+            </a:r>
+            <a:endParaRPr lang="en-US" altLang="zh-CN" dirty="0">
+              <a:effectLst/>
+            </a:endParaRPr>
+          </a:p>
+        </p:txBody>
+      </p:sp>
+    </p:spTree>
+    <p:extLst>
+      <p:ext uri="{BB962C8B-B14F-4D97-AF65-F5344CB8AC3E}">
+        <p14:creationId xmlns:p14="http://schemas.microsoft.com/office/powerpoint/2010/main" val="444701339"/>
       </p:ext>
     </p:extLst>
   </p:cSld>

</xml_diff>

<commit_message>
little update in PPT
</commit_message>
<xml_diff>
--- a/Kalman Filter/Kalman Filters_Slide.pptx
+++ b/Kalman Filter/Kalman Filters_Slide.pptx
@@ -4,8 +4,11 @@
   <p:sldMasterIdLst>
     <p:sldMasterId id="2147483660" r:id="rId1"/>
   </p:sldMasterIdLst>
+  <p:notesMasterIdLst>
+    <p:notesMasterId r:id="rId33"/>
+  </p:notesMasterIdLst>
   <p:handoutMasterIdLst>
-    <p:handoutMasterId r:id="rId33"/>
+    <p:handoutMasterId r:id="rId34"/>
   </p:handoutMasterIdLst>
   <p:sldIdLst>
     <p:sldId id="502" r:id="rId2"/>
@@ -253,7 +256,7 @@
           <a:p>
             <a:fld id="{9231DB76-5993-4784-9EAB-D9A89B457C93}" type="datetimeFigureOut">
               <a:rPr lang="zh-CN" altLang="en-US" smtClean="0"/>
-              <a:t>2024-03-23</a:t>
+              <a:t>2024-03-29</a:t>
             </a:fld>
             <a:endParaRPr lang="zh-CN" altLang="en-US"/>
           </a:p>
@@ -362,6 +365,493 @@
     </p:ext>
   </p:extLst>
 </p:handoutMaster>
+</file>
+
+<file path=ppt/ink/ink1.xml><?xml version="1.0" encoding="utf-8"?>
+<inkml:ink xmlns:inkml="http://www.w3.org/2003/InkML">
+  <inkml:definitions>
+    <inkml:context xml:id="ctx0">
+      <inkml:inkSource xml:id="inkSrc0">
+        <inkml:traceFormat>
+          <inkml:channel name="X" type="integer" min="-2.14748E9" max="2.14748E9" units="cm"/>
+          <inkml:channel name="Y" type="integer" min="-2.14748E9" max="2.14748E9" units="cm"/>
+          <inkml:channel name="F" type="integer" max="32767" units="dev"/>
+        </inkml:traceFormat>
+        <inkml:channelProperties>
+          <inkml:channelProperty channel="X" name="resolution" value="1000" units="1/cm"/>
+          <inkml:channelProperty channel="Y" name="resolution" value="1000" units="1/cm"/>
+          <inkml:channelProperty channel="F" name="resolution" value="0" units="1/dev"/>
+        </inkml:channelProperties>
+      </inkml:inkSource>
+      <inkml:timestamp xml:id="ts0" timeString="2024-03-29T16:18:55.283"/>
+    </inkml:context>
+    <inkml:brush xml:id="br0">
+      <inkml:brushProperty name="width" value="0.05" units="cm"/>
+      <inkml:brushProperty name="height" value="0.05" units="cm"/>
+    </inkml:brush>
+  </inkml:definitions>
+  <inkml:trace contextRef="#ctx0" brushRef="#br0">0 57 24575,'519'9'0,"22"0"0,50-20 0,-148 14 0,195 6 0,-414-10 0,1291 0 0,-1297 11 0,-26-1 0,969-7 0,-588-4 0,-182 3 0,448-2 0,-459-8 0,227-1 0,-342 1 0,-28 0 0,514 9 0,-361 1 0,-226-11 0,-12 0 0,-113 10 0,6 1 0,-1-2 0,1-2 0,-1-3 0,48-10 0,-77 12-455,-1 2 0,28-3 0,-25 5-6371</inkml:trace>
+</inkml:ink>
+</file>
+
+<file path=ppt/ink/ink2.xml><?xml version="1.0" encoding="utf-8"?>
+<inkml:ink xmlns:inkml="http://www.w3.org/2003/InkML">
+  <inkml:definitions>
+    <inkml:context xml:id="ctx0">
+      <inkml:inkSource xml:id="inkSrc0">
+        <inkml:traceFormat>
+          <inkml:channel name="X" type="integer" min="-2.14748E9" max="2.14748E9" units="cm"/>
+          <inkml:channel name="Y" type="integer" min="-2.14748E9" max="2.14748E9" units="cm"/>
+          <inkml:channel name="F" type="integer" max="32767" units="dev"/>
+        </inkml:traceFormat>
+        <inkml:channelProperties>
+          <inkml:channelProperty channel="X" name="resolution" value="1000" units="1/cm"/>
+          <inkml:channelProperty channel="Y" name="resolution" value="1000" units="1/cm"/>
+          <inkml:channelProperty channel="F" name="resolution" value="0" units="1/dev"/>
+        </inkml:channelProperties>
+      </inkml:inkSource>
+      <inkml:timestamp xml:id="ts0" timeString="2024-03-29T16:19:29.815"/>
+    </inkml:context>
+    <inkml:brush xml:id="br0">
+      <inkml:brushProperty name="width" value="0.05" units="cm"/>
+      <inkml:brushProperty name="height" value="0.05" units="cm"/>
+    </inkml:brush>
+  </inkml:definitions>
+  <inkml:trace contextRef="#ctx0" brushRef="#br0">1 39 24575,'0'-1'0,"1"0"0,-1 0 0,1 0 0,-1 0 0,1 0 0,0 0 0,0 0 0,-1 0 0,1 0 0,0 0 0,0 0 0,0 0 0,0 1 0,0-1 0,0 0 0,0 1 0,0-1 0,0 1 0,0-1 0,0 1 0,1-1 0,-1 1 0,1-1 0,30-7 0,24 1 0,1 2 0,112 6 0,-70 1 0,-34-2 0,0 4 0,0 2 0,-1 4 0,100 26 0,-42-4 0,206 28 0,127-18 0,540-27 0,-648-18 0,656 15 0,-454 0 0,-215-5 0,1077-12 0,-888-35 0,-1 1 0,412 19 0,1010 20 0,-1225-34 0,-655 24 0,-42 6 0,0 0 0,36 0 0,386 5-1365,-426-1-5461</inkml:trace>
+</inkml:ink>
+</file>
+
+<file path=ppt/notesMasters/notesMaster1.xml><?xml version="1.0" encoding="utf-8"?>
+<p:notesMaster xmlns:a="http://schemas.openxmlformats.org/drawingml/2006/main" xmlns:r="http://schemas.openxmlformats.org/officeDocument/2006/relationships" xmlns:p="http://schemas.openxmlformats.org/presentationml/2006/main">
+  <p:cSld>
+    <p:bg>
+      <p:bgRef idx="1001">
+        <a:schemeClr val="bg1"/>
+      </p:bgRef>
+    </p:bg>
+    <p:spTree>
+      <p:nvGrpSpPr>
+        <p:cNvPr id="1" name=""/>
+        <p:cNvGrpSpPr/>
+        <p:nvPr/>
+      </p:nvGrpSpPr>
+      <p:grpSpPr>
+        <a:xfrm>
+          <a:off x="0" y="0"/>
+          <a:ext cx="0" cy="0"/>
+          <a:chOff x="0" y="0"/>
+          <a:chExt cx="0" cy="0"/>
+        </a:xfrm>
+      </p:grpSpPr>
+      <p:sp>
+        <p:nvSpPr>
+          <p:cNvPr id="2" name="页眉占位符 1"/>
+          <p:cNvSpPr>
+            <a:spLocks noGrp="1"/>
+          </p:cNvSpPr>
+          <p:nvPr>
+            <p:ph type="hdr" sz="quarter"/>
+          </p:nvPr>
+        </p:nvSpPr>
+        <p:spPr>
+          <a:xfrm>
+            <a:off x="0" y="0"/>
+            <a:ext cx="2971800" cy="458788"/>
+          </a:xfrm>
+          <a:prstGeom prst="rect">
+            <a:avLst/>
+          </a:prstGeom>
+        </p:spPr>
+        <p:txBody>
+          <a:bodyPr vert="horz" lIns="91440" tIns="45720" rIns="91440" bIns="45720" rtlCol="0"/>
+          <a:lstStyle>
+            <a:lvl1pPr algn="l">
+              <a:defRPr sz="1200"/>
+            </a:lvl1pPr>
+          </a:lstStyle>
+          <a:p>
+            <a:endParaRPr lang="zh-CN" altLang="en-US"/>
+          </a:p>
+        </p:txBody>
+      </p:sp>
+      <p:sp>
+        <p:nvSpPr>
+          <p:cNvPr id="3" name="日期占位符 2"/>
+          <p:cNvSpPr>
+            <a:spLocks noGrp="1"/>
+          </p:cNvSpPr>
+          <p:nvPr>
+            <p:ph type="dt" idx="1"/>
+          </p:nvPr>
+        </p:nvSpPr>
+        <p:spPr>
+          <a:xfrm>
+            <a:off x="3884613" y="0"/>
+            <a:ext cx="2971800" cy="458788"/>
+          </a:xfrm>
+          <a:prstGeom prst="rect">
+            <a:avLst/>
+          </a:prstGeom>
+        </p:spPr>
+        <p:txBody>
+          <a:bodyPr vert="horz" lIns="91440" tIns="45720" rIns="91440" bIns="45720" rtlCol="0"/>
+          <a:lstStyle>
+            <a:lvl1pPr algn="r">
+              <a:defRPr sz="1200"/>
+            </a:lvl1pPr>
+          </a:lstStyle>
+          <a:p>
+            <a:fld id="{F45E9ACB-C599-466B-BA40-E77CAABA49E4}" type="datetimeFigureOut">
+              <a:rPr lang="zh-CN" altLang="en-US" smtClean="0"/>
+              <a:t>2024-03-30</a:t>
+            </a:fld>
+            <a:endParaRPr lang="zh-CN" altLang="en-US"/>
+          </a:p>
+        </p:txBody>
+      </p:sp>
+      <p:sp>
+        <p:nvSpPr>
+          <p:cNvPr id="4" name="幻灯片图像占位符 3"/>
+          <p:cNvSpPr>
+            <a:spLocks noGrp="1" noRot="1" noChangeAspect="1"/>
+          </p:cNvSpPr>
+          <p:nvPr>
+            <p:ph type="sldImg" idx="2"/>
+          </p:nvPr>
+        </p:nvSpPr>
+        <p:spPr>
+          <a:xfrm>
+            <a:off x="685800" y="1143000"/>
+            <a:ext cx="5486400" cy="3086100"/>
+          </a:xfrm>
+          <a:prstGeom prst="rect">
+            <a:avLst/>
+          </a:prstGeom>
+          <a:noFill/>
+          <a:ln w="12700">
+            <a:solidFill>
+              <a:prstClr val="black"/>
+            </a:solidFill>
+          </a:ln>
+        </p:spPr>
+        <p:txBody>
+          <a:bodyPr vert="horz" lIns="91440" tIns="45720" rIns="91440" bIns="45720" rtlCol="0" anchor="ctr"/>
+          <a:lstStyle/>
+          <a:p>
+            <a:endParaRPr lang="zh-CN" altLang="en-US"/>
+          </a:p>
+        </p:txBody>
+      </p:sp>
+      <p:sp>
+        <p:nvSpPr>
+          <p:cNvPr id="5" name="备注占位符 4"/>
+          <p:cNvSpPr>
+            <a:spLocks noGrp="1"/>
+          </p:cNvSpPr>
+          <p:nvPr>
+            <p:ph type="body" sz="quarter" idx="3"/>
+          </p:nvPr>
+        </p:nvSpPr>
+        <p:spPr>
+          <a:xfrm>
+            <a:off x="685800" y="4400550"/>
+            <a:ext cx="5486400" cy="3600450"/>
+          </a:xfrm>
+          <a:prstGeom prst="rect">
+            <a:avLst/>
+          </a:prstGeom>
+        </p:spPr>
+        <p:txBody>
+          <a:bodyPr vert="horz" lIns="91440" tIns="45720" rIns="91440" bIns="45720" rtlCol="0"/>
+          <a:lstStyle/>
+          <a:p>
+            <a:pPr lvl="0"/>
+            <a:r>
+              <a:rPr lang="zh-CN" altLang="en-US"/>
+              <a:t>单击此处编辑母版文本样式</a:t>
+            </a:r>
+          </a:p>
+          <a:p>
+            <a:pPr lvl="1"/>
+            <a:r>
+              <a:rPr lang="zh-CN" altLang="en-US"/>
+              <a:t>二级</a:t>
+            </a:r>
+          </a:p>
+          <a:p>
+            <a:pPr lvl="2"/>
+            <a:r>
+              <a:rPr lang="zh-CN" altLang="en-US"/>
+              <a:t>三级</a:t>
+            </a:r>
+          </a:p>
+          <a:p>
+            <a:pPr lvl="3"/>
+            <a:r>
+              <a:rPr lang="zh-CN" altLang="en-US"/>
+              <a:t>四级</a:t>
+            </a:r>
+          </a:p>
+          <a:p>
+            <a:pPr lvl="4"/>
+            <a:r>
+              <a:rPr lang="zh-CN" altLang="en-US"/>
+              <a:t>五级</a:t>
+            </a:r>
+          </a:p>
+        </p:txBody>
+      </p:sp>
+      <p:sp>
+        <p:nvSpPr>
+          <p:cNvPr id="6" name="页脚占位符 5"/>
+          <p:cNvSpPr>
+            <a:spLocks noGrp="1"/>
+          </p:cNvSpPr>
+          <p:nvPr>
+            <p:ph type="ftr" sz="quarter" idx="4"/>
+          </p:nvPr>
+        </p:nvSpPr>
+        <p:spPr>
+          <a:xfrm>
+            <a:off x="0" y="8685213"/>
+            <a:ext cx="2971800" cy="458787"/>
+          </a:xfrm>
+          <a:prstGeom prst="rect">
+            <a:avLst/>
+          </a:prstGeom>
+        </p:spPr>
+        <p:txBody>
+          <a:bodyPr vert="horz" lIns="91440" tIns="45720" rIns="91440" bIns="45720" rtlCol="0" anchor="b"/>
+          <a:lstStyle>
+            <a:lvl1pPr algn="l">
+              <a:defRPr sz="1200"/>
+            </a:lvl1pPr>
+          </a:lstStyle>
+          <a:p>
+            <a:endParaRPr lang="zh-CN" altLang="en-US"/>
+          </a:p>
+        </p:txBody>
+      </p:sp>
+      <p:sp>
+        <p:nvSpPr>
+          <p:cNvPr id="7" name="灯片编号占位符 6"/>
+          <p:cNvSpPr>
+            <a:spLocks noGrp="1"/>
+          </p:cNvSpPr>
+          <p:nvPr>
+            <p:ph type="sldNum" sz="quarter" idx="5"/>
+          </p:nvPr>
+        </p:nvSpPr>
+        <p:spPr>
+          <a:xfrm>
+            <a:off x="3884613" y="8685213"/>
+            <a:ext cx="2971800" cy="458787"/>
+          </a:xfrm>
+          <a:prstGeom prst="rect">
+            <a:avLst/>
+          </a:prstGeom>
+        </p:spPr>
+        <p:txBody>
+          <a:bodyPr vert="horz" lIns="91440" tIns="45720" rIns="91440" bIns="45720" rtlCol="0" anchor="b"/>
+          <a:lstStyle>
+            <a:lvl1pPr algn="r">
+              <a:defRPr sz="1200"/>
+            </a:lvl1pPr>
+          </a:lstStyle>
+          <a:p>
+            <a:fld id="{EA426BA6-99AC-40DA-AFEE-D6019D8F02B5}" type="slidenum">
+              <a:rPr lang="zh-CN" altLang="en-US" smtClean="0"/>
+              <a:t>‹#›</a:t>
+            </a:fld>
+            <a:endParaRPr lang="zh-CN" altLang="en-US"/>
+          </a:p>
+        </p:txBody>
+      </p:sp>
+    </p:spTree>
+    <p:extLst>
+      <p:ext uri="{BB962C8B-B14F-4D97-AF65-F5344CB8AC3E}">
+        <p14:creationId xmlns:p14="http://schemas.microsoft.com/office/powerpoint/2010/main" val="900563112"/>
+      </p:ext>
+    </p:extLst>
+  </p:cSld>
+  <p:clrMap bg1="lt1" tx1="dk1" bg2="lt2" tx2="dk2" accent1="accent1" accent2="accent2" accent3="accent3" accent4="accent4" accent5="accent5" accent6="accent6" hlink="hlink" folHlink="folHlink"/>
+  <p:notesStyle>
+    <a:lvl1pPr marL="0" algn="l" defTabSz="914400" rtl="0" eaLnBrk="1" latinLnBrk="0" hangingPunct="1">
+      <a:defRPr sz="1200" kern="1200">
+        <a:solidFill>
+          <a:schemeClr val="tx1"/>
+        </a:solidFill>
+        <a:latin typeface="+mn-lt"/>
+        <a:ea typeface="+mn-ea"/>
+        <a:cs typeface="+mn-cs"/>
+      </a:defRPr>
+    </a:lvl1pPr>
+    <a:lvl2pPr marL="457200" algn="l" defTabSz="914400" rtl="0" eaLnBrk="1" latinLnBrk="0" hangingPunct="1">
+      <a:defRPr sz="1200" kern="1200">
+        <a:solidFill>
+          <a:schemeClr val="tx1"/>
+        </a:solidFill>
+        <a:latin typeface="+mn-lt"/>
+        <a:ea typeface="+mn-ea"/>
+        <a:cs typeface="+mn-cs"/>
+      </a:defRPr>
+    </a:lvl2pPr>
+    <a:lvl3pPr marL="914400" algn="l" defTabSz="914400" rtl="0" eaLnBrk="1" latinLnBrk="0" hangingPunct="1">
+      <a:defRPr sz="1200" kern="1200">
+        <a:solidFill>
+          <a:schemeClr val="tx1"/>
+        </a:solidFill>
+        <a:latin typeface="+mn-lt"/>
+        <a:ea typeface="+mn-ea"/>
+        <a:cs typeface="+mn-cs"/>
+      </a:defRPr>
+    </a:lvl3pPr>
+    <a:lvl4pPr marL="1371600" algn="l" defTabSz="914400" rtl="0" eaLnBrk="1" latinLnBrk="0" hangingPunct="1">
+      <a:defRPr sz="1200" kern="1200">
+        <a:solidFill>
+          <a:schemeClr val="tx1"/>
+        </a:solidFill>
+        <a:latin typeface="+mn-lt"/>
+        <a:ea typeface="+mn-ea"/>
+        <a:cs typeface="+mn-cs"/>
+      </a:defRPr>
+    </a:lvl4pPr>
+    <a:lvl5pPr marL="1828800" algn="l" defTabSz="914400" rtl="0" eaLnBrk="1" latinLnBrk="0" hangingPunct="1">
+      <a:defRPr sz="1200" kern="1200">
+        <a:solidFill>
+          <a:schemeClr val="tx1"/>
+        </a:solidFill>
+        <a:latin typeface="+mn-lt"/>
+        <a:ea typeface="+mn-ea"/>
+        <a:cs typeface="+mn-cs"/>
+      </a:defRPr>
+    </a:lvl5pPr>
+    <a:lvl6pPr marL="2286000" algn="l" defTabSz="914400" rtl="0" eaLnBrk="1" latinLnBrk="0" hangingPunct="1">
+      <a:defRPr sz="1200" kern="1200">
+        <a:solidFill>
+          <a:schemeClr val="tx1"/>
+        </a:solidFill>
+        <a:latin typeface="+mn-lt"/>
+        <a:ea typeface="+mn-ea"/>
+        <a:cs typeface="+mn-cs"/>
+      </a:defRPr>
+    </a:lvl6pPr>
+    <a:lvl7pPr marL="2743200" algn="l" defTabSz="914400" rtl="0" eaLnBrk="1" latinLnBrk="0" hangingPunct="1">
+      <a:defRPr sz="1200" kern="1200">
+        <a:solidFill>
+          <a:schemeClr val="tx1"/>
+        </a:solidFill>
+        <a:latin typeface="+mn-lt"/>
+        <a:ea typeface="+mn-ea"/>
+        <a:cs typeface="+mn-cs"/>
+      </a:defRPr>
+    </a:lvl7pPr>
+    <a:lvl8pPr marL="3200400" algn="l" defTabSz="914400" rtl="0" eaLnBrk="1" latinLnBrk="0" hangingPunct="1">
+      <a:defRPr sz="1200" kern="1200">
+        <a:solidFill>
+          <a:schemeClr val="tx1"/>
+        </a:solidFill>
+        <a:latin typeface="+mn-lt"/>
+        <a:ea typeface="+mn-ea"/>
+        <a:cs typeface="+mn-cs"/>
+      </a:defRPr>
+    </a:lvl8pPr>
+    <a:lvl9pPr marL="3657600" algn="l" defTabSz="914400" rtl="0" eaLnBrk="1" latinLnBrk="0" hangingPunct="1">
+      <a:defRPr sz="1200" kern="1200">
+        <a:solidFill>
+          <a:schemeClr val="tx1"/>
+        </a:solidFill>
+        <a:latin typeface="+mn-lt"/>
+        <a:ea typeface="+mn-ea"/>
+        <a:cs typeface="+mn-cs"/>
+      </a:defRPr>
+    </a:lvl9pPr>
+  </p:notesStyle>
+</p:notesMaster>
+</file>
+
+<file path=ppt/notesSlides/notesSlide1.xml><?xml version="1.0" encoding="utf-8"?>
+<p:notes xmlns:a="http://schemas.openxmlformats.org/drawingml/2006/main" xmlns:r="http://schemas.openxmlformats.org/officeDocument/2006/relationships" xmlns:p="http://schemas.openxmlformats.org/presentationml/2006/main">
+  <p:cSld>
+    <p:spTree>
+      <p:nvGrpSpPr>
+        <p:cNvPr id="1" name=""/>
+        <p:cNvGrpSpPr/>
+        <p:nvPr/>
+      </p:nvGrpSpPr>
+      <p:grpSpPr>
+        <a:xfrm>
+          <a:off x="0" y="0"/>
+          <a:ext cx="0" cy="0"/>
+          <a:chOff x="0" y="0"/>
+          <a:chExt cx="0" cy="0"/>
+        </a:xfrm>
+      </p:grpSpPr>
+      <p:sp>
+        <p:nvSpPr>
+          <p:cNvPr id="2" name="幻灯片图像占位符 1"/>
+          <p:cNvSpPr>
+            <a:spLocks noGrp="1" noRot="1" noChangeAspect="1"/>
+          </p:cNvSpPr>
+          <p:nvPr>
+            <p:ph type="sldImg"/>
+          </p:nvPr>
+        </p:nvSpPr>
+        <p:spPr/>
+      </p:sp>
+      <p:sp>
+        <p:nvSpPr>
+          <p:cNvPr id="3" name="备注占位符 2"/>
+          <p:cNvSpPr>
+            <a:spLocks noGrp="1"/>
+          </p:cNvSpPr>
+          <p:nvPr>
+            <p:ph type="body" idx="1"/>
+          </p:nvPr>
+        </p:nvSpPr>
+        <p:spPr/>
+        <p:txBody>
+          <a:bodyPr/>
+          <a:lstStyle/>
+          <a:p>
+            <a:endParaRPr lang="zh-CN" altLang="en-US" dirty="0"/>
+          </a:p>
+        </p:txBody>
+      </p:sp>
+      <p:sp>
+        <p:nvSpPr>
+          <p:cNvPr id="4" name="灯片编号占位符 3"/>
+          <p:cNvSpPr>
+            <a:spLocks noGrp="1"/>
+          </p:cNvSpPr>
+          <p:nvPr>
+            <p:ph type="sldNum" sz="quarter" idx="5"/>
+          </p:nvPr>
+        </p:nvSpPr>
+        <p:spPr/>
+        <p:txBody>
+          <a:bodyPr/>
+          <a:lstStyle/>
+          <a:p>
+            <a:fld id="{EA426BA6-99AC-40DA-AFEE-D6019D8F02B5}" type="slidenum">
+              <a:rPr lang="zh-CN" altLang="en-US" smtClean="0"/>
+              <a:t>25</a:t>
+            </a:fld>
+            <a:endParaRPr lang="zh-CN" altLang="en-US"/>
+          </a:p>
+        </p:txBody>
+      </p:sp>
+    </p:spTree>
+    <p:extLst>
+      <p:ext uri="{BB962C8B-B14F-4D97-AF65-F5344CB8AC3E}">
+        <p14:creationId xmlns:p14="http://schemas.microsoft.com/office/powerpoint/2010/main" val="3927079587"/>
+      </p:ext>
+    </p:extLst>
+  </p:cSld>
+  <p:clrMapOvr>
+    <a:masterClrMapping/>
+  </p:clrMapOvr>
+</p:notes>
 </file>
 
 <file path=ppt/slideLayouts/slideLayout1.xml><?xml version="1.0" encoding="utf-8"?>
@@ -493,7 +983,7 @@
           <a:p>
             <a:fld id="{D997B5FA-0921-464F-AAE1-844C04324D75}" type="datetimeFigureOut">
               <a:rPr lang="zh-CN" altLang="en-US" smtClean="0"/>
-              <a:t>2024-03-23</a:t>
+              <a:t>2024-03-29</a:t>
             </a:fld>
             <a:endParaRPr lang="zh-CN" altLang="en-US"/>
           </a:p>
@@ -662,7 +1152,7 @@
           <a:p>
             <a:fld id="{D997B5FA-0921-464F-AAE1-844C04324D75}" type="datetimeFigureOut">
               <a:rPr lang="zh-CN" altLang="en-US" smtClean="0"/>
-              <a:t>2024-03-23</a:t>
+              <a:t>2024-03-29</a:t>
             </a:fld>
             <a:endParaRPr lang="zh-CN" altLang="en-US"/>
           </a:p>
@@ -841,7 +1331,7 @@
           <a:p>
             <a:fld id="{D997B5FA-0921-464F-AAE1-844C04324D75}" type="datetimeFigureOut">
               <a:rPr lang="zh-CN" altLang="en-US" smtClean="0"/>
-              <a:t>2024-03-23</a:t>
+              <a:t>2024-03-29</a:t>
             </a:fld>
             <a:endParaRPr lang="zh-CN" altLang="en-US"/>
           </a:p>
@@ -1067,7 +1557,7 @@
           <a:p>
             <a:fld id="{D997B5FA-0921-464F-AAE1-844C04324D75}" type="datetimeFigureOut">
               <a:rPr lang="zh-CN" altLang="en-US" smtClean="0"/>
-              <a:t>2024-03-23</a:t>
+              <a:t>2024-03-29</a:t>
             </a:fld>
             <a:endParaRPr lang="zh-CN" altLang="en-US"/>
           </a:p>
@@ -1313,7 +1803,7 @@
           <a:p>
             <a:fld id="{D997B5FA-0921-464F-AAE1-844C04324D75}" type="datetimeFigureOut">
               <a:rPr lang="zh-CN" altLang="en-US" smtClean="0"/>
-              <a:t>2024-03-23</a:t>
+              <a:t>2024-03-29</a:t>
             </a:fld>
             <a:endParaRPr lang="zh-CN" altLang="en-US"/>
           </a:p>
@@ -1543,7 +2033,7 @@
           <a:p>
             <a:fld id="{D997B5FA-0921-464F-AAE1-844C04324D75}" type="datetimeFigureOut">
               <a:rPr lang="zh-CN" altLang="en-US" smtClean="0"/>
-              <a:t>2024-03-23</a:t>
+              <a:t>2024-03-29</a:t>
             </a:fld>
             <a:endParaRPr lang="zh-CN" altLang="en-US"/>
           </a:p>
@@ -1908,7 +2398,7 @@
           <a:p>
             <a:fld id="{D997B5FA-0921-464F-AAE1-844C04324D75}" type="datetimeFigureOut">
               <a:rPr lang="zh-CN" altLang="en-US" smtClean="0"/>
-              <a:t>2024-03-23</a:t>
+              <a:t>2024-03-29</a:t>
             </a:fld>
             <a:endParaRPr lang="zh-CN" altLang="en-US"/>
           </a:p>
@@ -2026,7 +2516,7 @@
           <a:p>
             <a:fld id="{D997B5FA-0921-464F-AAE1-844C04324D75}" type="datetimeFigureOut">
               <a:rPr lang="zh-CN" altLang="en-US" smtClean="0"/>
-              <a:t>2024-03-23</a:t>
+              <a:t>2024-03-29</a:t>
             </a:fld>
             <a:endParaRPr lang="zh-CN" altLang="en-US"/>
           </a:p>
@@ -2122,7 +2612,7 @@
           <a:p>
             <a:fld id="{D997B5FA-0921-464F-AAE1-844C04324D75}" type="datetimeFigureOut">
               <a:rPr lang="zh-CN" altLang="en-US" smtClean="0"/>
-              <a:t>2024-03-23</a:t>
+              <a:t>2024-03-29</a:t>
             </a:fld>
             <a:endParaRPr lang="zh-CN" altLang="en-US"/>
           </a:p>
@@ -2398,7 +2888,7 @@
           <a:p>
             <a:fld id="{D997B5FA-0921-464F-AAE1-844C04324D75}" type="datetimeFigureOut">
               <a:rPr lang="zh-CN" altLang="en-US" smtClean="0"/>
-              <a:t>2024-03-23</a:t>
+              <a:t>2024-03-29</a:t>
             </a:fld>
             <a:endParaRPr lang="zh-CN" altLang="en-US"/>
           </a:p>
@@ -2651,7 +3141,7 @@
           <a:p>
             <a:fld id="{D997B5FA-0921-464F-AAE1-844C04324D75}" type="datetimeFigureOut">
               <a:rPr lang="zh-CN" altLang="en-US" smtClean="0"/>
-              <a:t>2024-03-23</a:t>
+              <a:t>2024-03-29</a:t>
             </a:fld>
             <a:endParaRPr lang="zh-CN" altLang="en-US"/>
           </a:p>
@@ -2874,7 +3364,7 @@
           <a:p>
             <a:fld id="{D997B5FA-0921-464F-AAE1-844C04324D75}" type="datetimeFigureOut">
               <a:rPr lang="zh-CN" altLang="en-US" smtClean="0"/>
-              <a:t>2024-03-23</a:t>
+              <a:t>2024-03-29</a:t>
             </a:fld>
             <a:endParaRPr lang="zh-CN" altLang="en-US"/>
           </a:p>
@@ -6319,7 +6809,7 @@
               <a:rPr lang="zh-CN" altLang="en-US" smtClean="0"/>
               <a:t>16</a:t>
             </a:fld>
-            <a:endParaRPr lang="zh-CN" altLang="en-US"/>
+            <a:endParaRPr lang="zh-CN" altLang="en-US" dirty="0"/>
           </a:p>
         </p:txBody>
       </p:sp>
@@ -11980,36 +12470,6 @@
       </p:sp>
       <p:pic>
         <p:nvPicPr>
-          <p:cNvPr id="4" name="图片 3">
-            <a:extLst>
-              <a:ext uri="{FF2B5EF4-FFF2-40B4-BE49-F238E27FC236}">
-                <a16:creationId xmlns:a16="http://schemas.microsoft.com/office/drawing/2014/main" id="{94DD53A8-CF31-39B1-93A9-DCE1D613117E}"/>
-              </a:ext>
-            </a:extLst>
-          </p:cNvPr>
-          <p:cNvPicPr>
-            <a:picLocks noChangeAspect="1"/>
-          </p:cNvPicPr>
-          <p:nvPr/>
-        </p:nvPicPr>
-        <p:blipFill>
-          <a:blip r:embed="rId2"/>
-          <a:stretch>
-            <a:fillRect/>
-          </a:stretch>
-        </p:blipFill>
-        <p:spPr>
-          <a:xfrm>
-            <a:off x="5712790" y="1693021"/>
-            <a:ext cx="5391427" cy="3206915"/>
-          </a:xfrm>
-          <a:prstGeom prst="rect">
-            <a:avLst/>
-          </a:prstGeom>
-        </p:spPr>
-      </p:pic>
-      <p:pic>
-        <p:nvPicPr>
           <p:cNvPr id="6" name="图片 5">
             <a:extLst>
               <a:ext uri="{FF2B5EF4-FFF2-40B4-BE49-F238E27FC236}">
@@ -12252,7 +12712,7 @@
         </p:blipFill>
         <p:spPr>
           <a:xfrm>
-            <a:off x="928517" y="3269413"/>
+            <a:off x="6924261" y="2501902"/>
             <a:ext cx="4076307" cy="1630523"/>
           </a:xfrm>
           <a:prstGeom prst="rect">
@@ -12282,7 +12742,7 @@
         </p:blipFill>
         <p:spPr>
           <a:xfrm>
-            <a:off x="928517" y="1868052"/>
+            <a:off x="2032884" y="2588688"/>
             <a:ext cx="2991403" cy="1163790"/>
           </a:xfrm>
           <a:prstGeom prst="rect">
@@ -12290,6 +12750,520 @@
           </a:prstGeom>
         </p:spPr>
       </p:pic>
+      <p:sp>
+        <p:nvSpPr>
+          <p:cNvPr id="3" name="矩形 2">
+            <a:extLst>
+              <a:ext uri="{FF2B5EF4-FFF2-40B4-BE49-F238E27FC236}">
+                <a16:creationId xmlns:a16="http://schemas.microsoft.com/office/drawing/2014/main" id="{7498947C-95A9-E6FB-ECBA-CD2594EAC76B}"/>
+              </a:ext>
+            </a:extLst>
+          </p:cNvPr>
+          <p:cNvSpPr/>
+          <p:nvPr/>
+        </p:nvSpPr>
+        <p:spPr>
+          <a:xfrm>
+            <a:off x="1546369" y="1563757"/>
+            <a:ext cx="4076307" cy="3061252"/>
+          </a:xfrm>
+          <a:prstGeom prst="rect">
+            <a:avLst/>
+          </a:prstGeom>
+          <a:noFill/>
+          <a:ln>
+            <a:solidFill>
+              <a:srgbClr val="000000"/>
+            </a:solidFill>
+          </a:ln>
+        </p:spPr>
+        <p:style>
+          <a:lnRef idx="2">
+            <a:schemeClr val="accent1">
+              <a:shade val="15000"/>
+            </a:schemeClr>
+          </a:lnRef>
+          <a:fillRef idx="1">
+            <a:schemeClr val="accent1"/>
+          </a:fillRef>
+          <a:effectRef idx="0">
+            <a:schemeClr val="accent1"/>
+          </a:effectRef>
+          <a:fontRef idx="minor">
+            <a:schemeClr val="lt1"/>
+          </a:fontRef>
+        </p:style>
+        <p:txBody>
+          <a:bodyPr rtlCol="0" anchor="ctr"/>
+          <a:lstStyle/>
+          <a:p>
+            <a:pPr algn="ctr"/>
+            <a:endParaRPr lang="zh-CN" altLang="en-US"/>
+          </a:p>
+        </p:txBody>
+      </p:sp>
+      <p:pic>
+        <p:nvPicPr>
+          <p:cNvPr id="5" name="图片 4">
+            <a:extLst>
+              <a:ext uri="{FF2B5EF4-FFF2-40B4-BE49-F238E27FC236}">
+                <a16:creationId xmlns:a16="http://schemas.microsoft.com/office/drawing/2014/main" id="{9A4C10EF-EFAE-8076-BE4C-99647DDCEA75}"/>
+              </a:ext>
+            </a:extLst>
+          </p:cNvPr>
+          <p:cNvPicPr>
+            <a:picLocks noChangeAspect="1"/>
+          </p:cNvPicPr>
+          <p:nvPr/>
+        </p:nvPicPr>
+        <p:blipFill>
+          <a:blip r:embed="rId7"/>
+          <a:stretch>
+            <a:fillRect/>
+          </a:stretch>
+        </p:blipFill>
+        <p:spPr>
+          <a:xfrm>
+            <a:off x="6811200" y="1563757"/>
+            <a:ext cx="4255450" cy="3072650"/>
+          </a:xfrm>
+          <a:prstGeom prst="rect">
+            <a:avLst/>
+          </a:prstGeom>
+        </p:spPr>
+      </p:pic>
+      <mc:AlternateContent xmlns:mc="http://schemas.openxmlformats.org/markup-compatibility/2006">
+        <mc:Choice xmlns:p14="http://schemas.microsoft.com/office/powerpoint/2010/main" Requires="p14">
+          <p:contentPart p14:bwMode="auto" r:id="rId8">
+            <p14:nvContentPartPr>
+              <p14:cNvPr id="22" name="墨迹 21">
+                <a:extLst>
+                  <a:ext uri="{FF2B5EF4-FFF2-40B4-BE49-F238E27FC236}">
+                    <a16:creationId xmlns:a16="http://schemas.microsoft.com/office/drawing/2014/main" id="{0302E788-6626-0344-EC60-E393FAE79B41}"/>
+                  </a:ext>
+                </a:extLst>
+              </p14:cNvPr>
+              <p14:cNvContentPartPr/>
+              <p14:nvPr/>
+            </p14:nvContentPartPr>
+            <p14:xfrm>
+              <a:off x="1563730" y="2278878"/>
+              <a:ext cx="4027680" cy="34200"/>
+            </p14:xfrm>
+          </p:contentPart>
+        </mc:Choice>
+        <mc:Fallback>
+          <p:pic>
+            <p:nvPicPr>
+              <p:cNvPr id="22" name="墨迹 21">
+                <a:extLst>
+                  <a:ext uri="{FF2B5EF4-FFF2-40B4-BE49-F238E27FC236}">
+                    <a16:creationId xmlns:a16="http://schemas.microsoft.com/office/drawing/2014/main" id="{0302E788-6626-0344-EC60-E393FAE79B41}"/>
+                  </a:ext>
+                </a:extLst>
+              </p:cNvPr>
+              <p:cNvPicPr/>
+              <p:nvPr/>
+            </p:nvPicPr>
+            <p:blipFill>
+              <a:blip r:embed="rId9"/>
+              <a:stretch>
+                <a:fillRect/>
+              </a:stretch>
+            </p:blipFill>
+            <p:spPr>
+              <a:xfrm>
+                <a:off x="1554730" y="2270238"/>
+                <a:ext cx="4045320" cy="51840"/>
+              </a:xfrm>
+              <a:prstGeom prst="rect">
+                <a:avLst/>
+              </a:prstGeom>
+            </p:spPr>
+          </p:pic>
+        </mc:Fallback>
+      </mc:AlternateContent>
+      <mc:AlternateContent xmlns:mc="http://schemas.openxmlformats.org/markup-compatibility/2006">
+        <mc:Choice xmlns:p14="http://schemas.microsoft.com/office/powerpoint/2010/main" Requires="p14">
+          <p:contentPart p14:bwMode="auto" r:id="rId10">
+            <p14:nvContentPartPr>
+              <p14:cNvPr id="30" name="墨迹 29">
+                <a:extLst>
+                  <a:ext uri="{FF2B5EF4-FFF2-40B4-BE49-F238E27FC236}">
+                    <a16:creationId xmlns:a16="http://schemas.microsoft.com/office/drawing/2014/main" id="{333C0397-E351-2A34-A67C-FA80F00874EE}"/>
+                  </a:ext>
+                </a:extLst>
+              </p14:cNvPr>
+              <p14:cNvContentPartPr/>
+              <p14:nvPr/>
+            </p14:nvContentPartPr>
+            <p14:xfrm>
+              <a:off x="6864370" y="2231718"/>
+              <a:ext cx="4202280" cy="85320"/>
+            </p14:xfrm>
+          </p:contentPart>
+        </mc:Choice>
+        <mc:Fallback>
+          <p:pic>
+            <p:nvPicPr>
+              <p:cNvPr id="30" name="墨迹 29">
+                <a:extLst>
+                  <a:ext uri="{FF2B5EF4-FFF2-40B4-BE49-F238E27FC236}">
+                    <a16:creationId xmlns:a16="http://schemas.microsoft.com/office/drawing/2014/main" id="{333C0397-E351-2A34-A67C-FA80F00874EE}"/>
+                  </a:ext>
+                </a:extLst>
+              </p:cNvPr>
+              <p:cNvPicPr/>
+              <p:nvPr/>
+            </p:nvPicPr>
+            <p:blipFill>
+              <a:blip r:embed="rId11"/>
+              <a:stretch>
+                <a:fillRect/>
+              </a:stretch>
+            </p:blipFill>
+            <p:spPr>
+              <a:xfrm>
+                <a:off x="6855730" y="2222718"/>
+                <a:ext cx="4219920" cy="102960"/>
+              </a:xfrm>
+              <a:prstGeom prst="rect">
+                <a:avLst/>
+              </a:prstGeom>
+            </p:spPr>
+          </p:pic>
+        </mc:Fallback>
+      </mc:AlternateContent>
+      <p:sp>
+        <p:nvSpPr>
+          <p:cNvPr id="31" name="箭头: 下弧形 30">
+            <a:extLst>
+              <a:ext uri="{FF2B5EF4-FFF2-40B4-BE49-F238E27FC236}">
+                <a16:creationId xmlns:a16="http://schemas.microsoft.com/office/drawing/2014/main" id="{70F5C8C2-3451-6B0E-091E-F869BED7342B}"/>
+              </a:ext>
+            </a:extLst>
+          </p:cNvPr>
+          <p:cNvSpPr/>
+          <p:nvPr/>
+        </p:nvSpPr>
+        <p:spPr>
+          <a:xfrm flipH="1">
+            <a:off x="4651512" y="4772746"/>
+            <a:ext cx="3087757" cy="978408"/>
+          </a:xfrm>
+          <a:prstGeom prst="curvedUpArrow">
+            <a:avLst/>
+          </a:prstGeom>
+        </p:spPr>
+        <p:style>
+          <a:lnRef idx="2">
+            <a:schemeClr val="accent1">
+              <a:shade val="15000"/>
+            </a:schemeClr>
+          </a:lnRef>
+          <a:fillRef idx="1">
+            <a:schemeClr val="accent1"/>
+          </a:fillRef>
+          <a:effectRef idx="0">
+            <a:schemeClr val="accent1"/>
+          </a:effectRef>
+          <a:fontRef idx="minor">
+            <a:schemeClr val="lt1"/>
+          </a:fontRef>
+        </p:style>
+        <p:txBody>
+          <a:bodyPr rtlCol="0" anchor="ctr"/>
+          <a:lstStyle/>
+          <a:p>
+            <a:pPr algn="ctr"/>
+            <a:endParaRPr lang="zh-CN" altLang="en-US">
+              <a:solidFill>
+                <a:schemeClr val="tx1"/>
+              </a:solidFill>
+            </a:endParaRPr>
+          </a:p>
+        </p:txBody>
+      </p:sp>
+      <p:sp>
+        <p:nvSpPr>
+          <p:cNvPr id="32" name="箭头: 下弧形 31">
+            <a:extLst>
+              <a:ext uri="{FF2B5EF4-FFF2-40B4-BE49-F238E27FC236}">
+                <a16:creationId xmlns:a16="http://schemas.microsoft.com/office/drawing/2014/main" id="{23B623FF-4CD4-77E3-641C-6CBC9708C909}"/>
+              </a:ext>
+            </a:extLst>
+          </p:cNvPr>
+          <p:cNvSpPr/>
+          <p:nvPr/>
+        </p:nvSpPr>
+        <p:spPr>
+          <a:xfrm rot="10800000" flipH="1">
+            <a:off x="4717773" y="363337"/>
+            <a:ext cx="3087757" cy="995849"/>
+          </a:xfrm>
+          <a:prstGeom prst="curvedUpArrow">
+            <a:avLst/>
+          </a:prstGeom>
+        </p:spPr>
+        <p:style>
+          <a:lnRef idx="2">
+            <a:schemeClr val="accent1">
+              <a:shade val="15000"/>
+            </a:schemeClr>
+          </a:lnRef>
+          <a:fillRef idx="1">
+            <a:schemeClr val="accent1"/>
+          </a:fillRef>
+          <a:effectRef idx="0">
+            <a:schemeClr val="accent1"/>
+          </a:effectRef>
+          <a:fontRef idx="minor">
+            <a:schemeClr val="lt1"/>
+          </a:fontRef>
+        </p:style>
+        <p:txBody>
+          <a:bodyPr rtlCol="0" anchor="ctr"/>
+          <a:lstStyle/>
+          <a:p>
+            <a:pPr algn="ctr"/>
+            <a:endParaRPr lang="zh-CN" altLang="en-US">
+              <a:solidFill>
+                <a:schemeClr val="tx1"/>
+              </a:solidFill>
+            </a:endParaRPr>
+          </a:p>
+        </p:txBody>
+      </p:sp>
+      <p:sp>
+        <p:nvSpPr>
+          <p:cNvPr id="33" name="文本框 32">
+            <a:extLst>
+              <a:ext uri="{FF2B5EF4-FFF2-40B4-BE49-F238E27FC236}">
+                <a16:creationId xmlns:a16="http://schemas.microsoft.com/office/drawing/2014/main" id="{3F6EF990-32CB-24C9-71D3-3B8E13483C7D}"/>
+              </a:ext>
+            </a:extLst>
+          </p:cNvPr>
+          <p:cNvSpPr txBox="1"/>
+          <p:nvPr/>
+        </p:nvSpPr>
+        <p:spPr>
+          <a:xfrm>
+            <a:off x="2434229" y="1596919"/>
+            <a:ext cx="2257698" cy="646331"/>
+          </a:xfrm>
+          <a:prstGeom prst="rect">
+            <a:avLst/>
+          </a:prstGeom>
+          <a:noFill/>
+        </p:spPr>
+        <p:txBody>
+          <a:bodyPr wrap="square" rtlCol="0">
+            <a:spAutoFit/>
+          </a:bodyPr>
+          <a:lstStyle/>
+          <a:p>
+            <a:pPr algn="ctr"/>
+            <a:r>
+              <a:rPr lang="en-US" altLang="zh-CN" dirty="0"/>
+              <a:t>Time Update</a:t>
+            </a:r>
+          </a:p>
+          <a:p>
+            <a:pPr algn="ctr"/>
+            <a:r>
+              <a:rPr lang="en-US" altLang="zh-CN" dirty="0"/>
+              <a:t>(Predict)</a:t>
+            </a:r>
+            <a:endParaRPr lang="zh-CN" altLang="en-US" dirty="0"/>
+          </a:p>
+        </p:txBody>
+      </p:sp>
+      <p:sp>
+        <p:nvSpPr>
+          <p:cNvPr id="34" name="箭头: 下 33">
+            <a:extLst>
+              <a:ext uri="{FF2B5EF4-FFF2-40B4-BE49-F238E27FC236}">
+                <a16:creationId xmlns:a16="http://schemas.microsoft.com/office/drawing/2014/main" id="{F32F48D6-BD93-0B4C-6892-FD03B02E26C9}"/>
+              </a:ext>
+            </a:extLst>
+          </p:cNvPr>
+          <p:cNvSpPr/>
+          <p:nvPr/>
+        </p:nvSpPr>
+        <p:spPr>
+          <a:xfrm rot="10800000">
+            <a:off x="2932004" y="4829580"/>
+            <a:ext cx="484632" cy="978408"/>
+          </a:xfrm>
+          <a:prstGeom prst="downArrow">
+            <a:avLst/>
+          </a:prstGeom>
+        </p:spPr>
+        <p:style>
+          <a:lnRef idx="2">
+            <a:schemeClr val="accent1">
+              <a:shade val="15000"/>
+            </a:schemeClr>
+          </a:lnRef>
+          <a:fillRef idx="1">
+            <a:schemeClr val="accent1"/>
+          </a:fillRef>
+          <a:effectRef idx="0">
+            <a:schemeClr val="accent1"/>
+          </a:effectRef>
+          <a:fontRef idx="minor">
+            <a:schemeClr val="lt1"/>
+          </a:fontRef>
+        </p:style>
+        <p:txBody>
+          <a:bodyPr rtlCol="0" anchor="ctr"/>
+          <a:lstStyle/>
+          <a:p>
+            <a:pPr algn="ctr"/>
+            <a:endParaRPr lang="zh-CN" altLang="en-US"/>
+          </a:p>
+        </p:txBody>
+      </p:sp>
+      <p:sp>
+        <p:nvSpPr>
+          <p:cNvPr id="35" name="文本框 34">
+            <a:extLst>
+              <a:ext uri="{FF2B5EF4-FFF2-40B4-BE49-F238E27FC236}">
+                <a16:creationId xmlns:a16="http://schemas.microsoft.com/office/drawing/2014/main" id="{CD217FCC-D6A5-3261-BF09-6737B9963C9E}"/>
+              </a:ext>
+            </a:extLst>
+          </p:cNvPr>
+          <p:cNvSpPr txBox="1"/>
+          <p:nvPr/>
+        </p:nvSpPr>
+        <p:spPr>
+          <a:xfrm>
+            <a:off x="1842052" y="6016487"/>
+            <a:ext cx="2007705" cy="369332"/>
+          </a:xfrm>
+          <a:prstGeom prst="rect">
+            <a:avLst/>
+          </a:prstGeom>
+          <a:noFill/>
+        </p:spPr>
+        <p:txBody>
+          <a:bodyPr wrap="square" rtlCol="0">
+            <a:spAutoFit/>
+          </a:bodyPr>
+          <a:lstStyle/>
+          <a:p>
+            <a:r>
+              <a:rPr lang="en-US" altLang="zh-CN" dirty="0"/>
+              <a:t>Input               and          </a:t>
+            </a:r>
+            <a:endParaRPr lang="zh-CN" altLang="en-US" dirty="0"/>
+          </a:p>
+        </p:txBody>
+      </p:sp>
+      <p:pic>
+        <p:nvPicPr>
+          <p:cNvPr id="37" name="图片 36">
+            <a:extLst>
+              <a:ext uri="{FF2B5EF4-FFF2-40B4-BE49-F238E27FC236}">
+                <a16:creationId xmlns:a16="http://schemas.microsoft.com/office/drawing/2014/main" id="{9603324E-9EA4-4D70-30CF-F1A9D3AF22D4}"/>
+              </a:ext>
+            </a:extLst>
+          </p:cNvPr>
+          <p:cNvPicPr>
+            <a:picLocks noChangeAspect="1"/>
+          </p:cNvPicPr>
+          <p:nvPr/>
+        </p:nvPicPr>
+        <p:blipFill>
+          <a:blip r:embed="rId12"/>
+          <a:stretch>
+            <a:fillRect/>
+          </a:stretch>
+        </p:blipFill>
+        <p:spPr>
+          <a:xfrm>
+            <a:off x="3705460" y="6045956"/>
+            <a:ext cx="642480" cy="339863"/>
+          </a:xfrm>
+          <a:prstGeom prst="rect">
+            <a:avLst/>
+          </a:prstGeom>
+        </p:spPr>
+      </p:pic>
+      <p:pic>
+        <p:nvPicPr>
+          <p:cNvPr id="39" name="图片 38">
+            <a:extLst>
+              <a:ext uri="{FF2B5EF4-FFF2-40B4-BE49-F238E27FC236}">
+                <a16:creationId xmlns:a16="http://schemas.microsoft.com/office/drawing/2014/main" id="{76907663-81FC-F00D-8BE6-CF8212CD0D0B}"/>
+              </a:ext>
+            </a:extLst>
+          </p:cNvPr>
+          <p:cNvPicPr>
+            <a:picLocks noChangeAspect="1"/>
+          </p:cNvPicPr>
+          <p:nvPr/>
+        </p:nvPicPr>
+        <p:blipFill>
+          <a:blip r:embed="rId13"/>
+          <a:stretch>
+            <a:fillRect/>
+          </a:stretch>
+        </p:blipFill>
+        <p:spPr>
+          <a:xfrm>
+            <a:off x="2517487" y="6044214"/>
+            <a:ext cx="656833" cy="343345"/>
+          </a:xfrm>
+          <a:prstGeom prst="rect">
+            <a:avLst/>
+          </a:prstGeom>
+        </p:spPr>
+      </p:pic>
+      <p:sp>
+        <p:nvSpPr>
+          <p:cNvPr id="40" name="文本框 39">
+            <a:extLst>
+              <a:ext uri="{FF2B5EF4-FFF2-40B4-BE49-F238E27FC236}">
+                <a16:creationId xmlns:a16="http://schemas.microsoft.com/office/drawing/2014/main" id="{4BBFBD5E-22FC-0C88-FAC1-74348F156B88}"/>
+              </a:ext>
+            </a:extLst>
+          </p:cNvPr>
+          <p:cNvSpPr txBox="1"/>
+          <p:nvPr/>
+        </p:nvSpPr>
+        <p:spPr>
+          <a:xfrm>
+            <a:off x="7857727" y="1585387"/>
+            <a:ext cx="2533733" cy="646331"/>
+          </a:xfrm>
+          <a:prstGeom prst="rect">
+            <a:avLst/>
+          </a:prstGeom>
+          <a:noFill/>
+        </p:spPr>
+        <p:txBody>
+          <a:bodyPr wrap="square" rtlCol="0">
+            <a:spAutoFit/>
+          </a:bodyPr>
+          <a:lstStyle/>
+          <a:p>
+            <a:pPr algn="ctr"/>
+            <a:r>
+              <a:rPr lang="en-US" altLang="zh-CN" dirty="0"/>
+              <a:t>Measurement Update</a:t>
+            </a:r>
+          </a:p>
+          <a:p>
+            <a:pPr algn="ctr"/>
+            <a:r>
+              <a:rPr lang="en-US" altLang="zh-CN" dirty="0"/>
+              <a:t>(Correct)</a:t>
+            </a:r>
+            <a:endParaRPr lang="zh-CN" altLang="en-US" dirty="0"/>
+          </a:p>
+        </p:txBody>
+      </p:sp>
     </p:spTree>
     <p:extLst>
       <p:ext uri="{BB962C8B-B14F-4D97-AF65-F5344CB8AC3E}">
@@ -15262,6 +16236,40 @@
           </a:prstGeom>
         </p:spPr>
       </p:pic>
+      <p:sp>
+        <p:nvSpPr>
+          <p:cNvPr id="2" name="灯片编号占位符 1">
+            <a:extLst>
+              <a:ext uri="{FF2B5EF4-FFF2-40B4-BE49-F238E27FC236}">
+                <a16:creationId xmlns:a16="http://schemas.microsoft.com/office/drawing/2014/main" id="{F1AC9F72-FD9C-1DE2-B7A3-41C6E4996E9A}"/>
+              </a:ext>
+            </a:extLst>
+          </p:cNvPr>
+          <p:cNvSpPr>
+            <a:spLocks noGrp="1"/>
+          </p:cNvSpPr>
+          <p:nvPr>
+            <p:ph type="sldNum" sz="quarter" idx="12"/>
+          </p:nvPr>
+        </p:nvSpPr>
+        <p:spPr>
+          <a:xfrm>
+            <a:off x="8610600" y="6356350"/>
+            <a:ext cx="2743200" cy="365125"/>
+          </a:xfrm>
+        </p:spPr>
+        <p:txBody>
+          <a:bodyPr/>
+          <a:lstStyle/>
+          <a:p>
+            <a:fld id="{565CE74E-AB26-4998-AD42-012C4C1AD076}" type="slidenum">
+              <a:rPr lang="zh-CN" altLang="en-US" smtClean="0"/>
+              <a:t>3</a:t>
+            </a:fld>
+            <a:endParaRPr lang="zh-CN" altLang="en-US" dirty="0"/>
+          </a:p>
+        </p:txBody>
+      </p:sp>
     </p:spTree>
     <p:extLst>
       <p:ext uri="{BB962C8B-B14F-4D97-AF65-F5344CB8AC3E}">
@@ -15454,7 +16462,7 @@
         </p:nvSpPr>
         <p:spPr>
           <a:xfrm>
-            <a:off x="1082654" y="717658"/>
+            <a:off x="943375" y="4629594"/>
             <a:ext cx="6096000" cy="1229632"/>
           </a:xfrm>
           <a:prstGeom prst="rect">
@@ -15538,6 +16546,184 @@
               <a:uFillTx/>
               <a:latin typeface="Times New Roman" panose="02020603050405020304" pitchFamily="18" charset="0"/>
               <a:ea typeface="微软雅黑" panose="020B0503020204020204" pitchFamily="34" charset="-122"/>
+              <a:cs typeface="Times New Roman" panose="02020603050405020304" pitchFamily="18" charset="0"/>
+            </a:endParaRPr>
+          </a:p>
+        </p:txBody>
+      </p:sp>
+      <p:pic>
+        <p:nvPicPr>
+          <p:cNvPr id="3" name="图片 2">
+            <a:extLst>
+              <a:ext uri="{FF2B5EF4-FFF2-40B4-BE49-F238E27FC236}">
+                <a16:creationId xmlns:a16="http://schemas.microsoft.com/office/drawing/2014/main" id="{D4B29E20-8C65-51AD-0C3F-B6EF03168E74}"/>
+              </a:ext>
+            </a:extLst>
+          </p:cNvPr>
+          <p:cNvPicPr>
+            <a:picLocks noChangeAspect="1"/>
+          </p:cNvPicPr>
+          <p:nvPr/>
+        </p:nvPicPr>
+        <p:blipFill>
+          <a:blip r:embed="rId3"/>
+          <a:stretch>
+            <a:fillRect/>
+          </a:stretch>
+        </p:blipFill>
+        <p:spPr>
+          <a:xfrm>
+            <a:off x="1315474" y="1263865"/>
+            <a:ext cx="461791" cy="341096"/>
+          </a:xfrm>
+          <a:prstGeom prst="rect">
+            <a:avLst/>
+          </a:prstGeom>
+        </p:spPr>
+      </p:pic>
+      <p:pic>
+        <p:nvPicPr>
+          <p:cNvPr id="6" name="图片 5">
+            <a:extLst>
+              <a:ext uri="{FF2B5EF4-FFF2-40B4-BE49-F238E27FC236}">
+                <a16:creationId xmlns:a16="http://schemas.microsoft.com/office/drawing/2014/main" id="{F7D9EE6C-108C-9E7A-028B-E8AF19725F36}"/>
+              </a:ext>
+            </a:extLst>
+          </p:cNvPr>
+          <p:cNvPicPr>
+            <a:picLocks noChangeAspect="1"/>
+          </p:cNvPicPr>
+          <p:nvPr/>
+        </p:nvPicPr>
+        <p:blipFill>
+          <a:blip r:embed="rId4"/>
+          <a:stretch>
+            <a:fillRect/>
+          </a:stretch>
+        </p:blipFill>
+        <p:spPr>
+          <a:xfrm>
+            <a:off x="2179787" y="1263865"/>
+            <a:ext cx="524124" cy="341096"/>
+          </a:xfrm>
+          <a:prstGeom prst="rect">
+            <a:avLst/>
+          </a:prstGeom>
+        </p:spPr>
+      </p:pic>
+      <p:pic>
+        <p:nvPicPr>
+          <p:cNvPr id="8" name="图片 7">
+            <a:extLst>
+              <a:ext uri="{FF2B5EF4-FFF2-40B4-BE49-F238E27FC236}">
+                <a16:creationId xmlns:a16="http://schemas.microsoft.com/office/drawing/2014/main" id="{766325A1-0C59-CF97-2592-B9FC4E485085}"/>
+              </a:ext>
+            </a:extLst>
+          </p:cNvPr>
+          <p:cNvPicPr>
+            <a:picLocks noChangeAspect="1"/>
+          </p:cNvPicPr>
+          <p:nvPr/>
+        </p:nvPicPr>
+        <p:blipFill>
+          <a:blip r:embed="rId5"/>
+          <a:stretch>
+            <a:fillRect/>
+          </a:stretch>
+        </p:blipFill>
+        <p:spPr>
+          <a:xfrm>
+            <a:off x="1315474" y="2662962"/>
+            <a:ext cx="5430473" cy="460323"/>
+          </a:xfrm>
+          <a:prstGeom prst="rect">
+            <a:avLst/>
+          </a:prstGeom>
+        </p:spPr>
+      </p:pic>
+      <p:sp>
+        <p:nvSpPr>
+          <p:cNvPr id="9" name="文本框 8">
+            <a:extLst>
+              <a:ext uri="{FF2B5EF4-FFF2-40B4-BE49-F238E27FC236}">
+                <a16:creationId xmlns:a16="http://schemas.microsoft.com/office/drawing/2014/main" id="{9C028844-4CEC-6CCC-6E74-7E9328ABCA9A}"/>
+              </a:ext>
+            </a:extLst>
+          </p:cNvPr>
+          <p:cNvSpPr txBox="1"/>
+          <p:nvPr/>
+        </p:nvSpPr>
+        <p:spPr>
+          <a:xfrm>
+            <a:off x="2987769" y="1281795"/>
+            <a:ext cx="5380606" cy="646331"/>
+          </a:xfrm>
+          <a:prstGeom prst="rect">
+            <a:avLst/>
+          </a:prstGeom>
+          <a:noFill/>
+        </p:spPr>
+        <p:txBody>
+          <a:bodyPr wrap="square" rtlCol="0">
+            <a:spAutoFit/>
+          </a:bodyPr>
+          <a:lstStyle/>
+          <a:p>
+            <a:r>
+              <a:rPr lang="en-US" altLang="zh-CN" dirty="0">
+                <a:latin typeface="Times New Roman" panose="02020603050405020304" pitchFamily="18" charset="0"/>
+                <a:cs typeface="Times New Roman" panose="02020603050405020304" pitchFamily="18" charset="0"/>
+              </a:rPr>
+              <a:t>is Jacobian Matrices. </a:t>
+            </a:r>
+          </a:p>
+          <a:p>
+            <a:r>
+              <a:rPr lang="en-US" altLang="zh-CN" dirty="0"/>
+              <a:t> </a:t>
+            </a:r>
+            <a:endParaRPr lang="zh-CN" altLang="en-US" dirty="0"/>
+          </a:p>
+        </p:txBody>
+      </p:sp>
+      <p:sp>
+        <p:nvSpPr>
+          <p:cNvPr id="11" name="文本框 10">
+            <a:extLst>
+              <a:ext uri="{FF2B5EF4-FFF2-40B4-BE49-F238E27FC236}">
+                <a16:creationId xmlns:a16="http://schemas.microsoft.com/office/drawing/2014/main" id="{B5CBE76A-1EF5-DD70-72A4-B1CC637D9706}"/>
+              </a:ext>
+            </a:extLst>
+          </p:cNvPr>
+          <p:cNvSpPr txBox="1"/>
+          <p:nvPr/>
+        </p:nvSpPr>
+        <p:spPr>
+          <a:xfrm>
+            <a:off x="744549" y="2110878"/>
+            <a:ext cx="6094990" cy="369332"/>
+          </a:xfrm>
+          <a:prstGeom prst="rect">
+            <a:avLst/>
+          </a:prstGeom>
+          <a:noFill/>
+        </p:spPr>
+        <p:txBody>
+          <a:bodyPr wrap="square">
+            <a:spAutoFit/>
+          </a:bodyPr>
+          <a:lstStyle/>
+          <a:p>
+            <a:pPr lvl="1"/>
+            <a:r>
+              <a:rPr lang="en-US" altLang="zh-CN" dirty="0">
+                <a:latin typeface="Times New Roman" panose="02020603050405020304" pitchFamily="18" charset="0"/>
+                <a:cs typeface="Times New Roman" panose="02020603050405020304" pitchFamily="18" charset="0"/>
+              </a:rPr>
+              <a:t>So the Kalman gain will change a little:</a:t>
+            </a:r>
+            <a:endParaRPr lang="zh-CN" altLang="en-US" dirty="0">
+              <a:latin typeface="Times New Roman" panose="02020603050405020304" pitchFamily="18" charset="0"/>
               <a:cs typeface="Times New Roman" panose="02020603050405020304" pitchFamily="18" charset="0"/>
             </a:endParaRPr>
           </a:p>
@@ -16111,7 +17297,7 @@
               <a:rPr lang="zh-CN" altLang="en-US" smtClean="0"/>
               <a:t>4</a:t>
             </a:fld>
-            <a:endParaRPr lang="zh-CN" altLang="en-US"/>
+            <a:endParaRPr lang="zh-CN" altLang="en-US" dirty="0"/>
           </a:p>
         </p:txBody>
       </p:sp>
@@ -19972,4 +21158,299 @@
     </a:ext>
   </a:extLst>
 </a:theme>
+</file>
+
+<file path=ppt/theme/theme3.xml><?xml version="1.0" encoding="utf-8"?>
+<a:theme xmlns:a="http://schemas.openxmlformats.org/drawingml/2006/main" name="Office 主题​​">
+  <a:themeElements>
+    <a:clrScheme name="Office">
+      <a:dk1>
+        <a:sysClr val="windowText" lastClr="000000"/>
+      </a:dk1>
+      <a:lt1>
+        <a:sysClr val="window" lastClr="FFFFFF"/>
+      </a:lt1>
+      <a:dk2>
+        <a:srgbClr val="44546A"/>
+      </a:dk2>
+      <a:lt2>
+        <a:srgbClr val="E7E6E6"/>
+      </a:lt2>
+      <a:accent1>
+        <a:srgbClr val="4472C4"/>
+      </a:accent1>
+      <a:accent2>
+        <a:srgbClr val="ED7D31"/>
+      </a:accent2>
+      <a:accent3>
+        <a:srgbClr val="A5A5A5"/>
+      </a:accent3>
+      <a:accent4>
+        <a:srgbClr val="FFC000"/>
+      </a:accent4>
+      <a:accent5>
+        <a:srgbClr val="5B9BD5"/>
+      </a:accent5>
+      <a:accent6>
+        <a:srgbClr val="70AD47"/>
+      </a:accent6>
+      <a:hlink>
+        <a:srgbClr val="0563C1"/>
+      </a:hlink>
+      <a:folHlink>
+        <a:srgbClr val="954F72"/>
+      </a:folHlink>
+    </a:clrScheme>
+    <a:fontScheme name="Office">
+      <a:majorFont>
+        <a:latin typeface="等线 Light" panose="020F0302020204030204"/>
+        <a:ea typeface=""/>
+        <a:cs typeface=""/>
+        <a:font script="Jpan" typeface="游ゴシック Light"/>
+        <a:font script="Hang" typeface="맑은 고딕"/>
+        <a:font script="Hans" typeface="等线 Light"/>
+        <a:font script="Hant" typeface="新細明體"/>
+        <a:font script="Arab" typeface="Times New Roman"/>
+        <a:font script="Hebr" typeface="Times New Roman"/>
+        <a:font script="Thai" typeface="Angsana New"/>
+        <a:font script="Ethi" typeface="Nyala"/>
+        <a:font script="Beng" typeface="Vrinda"/>
+        <a:font script="Gujr" typeface="Shruti"/>
+        <a:font script="Khmr" typeface="MoolBoran"/>
+        <a:font script="Knda" typeface="Tunga"/>
+        <a:font script="Guru" typeface="Raavi"/>
+        <a:font script="Cans" typeface="Euphemia"/>
+        <a:font script="Cher" typeface="Plantagenet Cherokee"/>
+        <a:font script="Yiii" typeface="Microsoft Yi Baiti"/>
+        <a:font script="Tibt" typeface="Microsoft Himalaya"/>
+        <a:font script="Thaa" typeface="MV Boli"/>
+        <a:font script="Deva" typeface="Mangal"/>
+        <a:font script="Telu" typeface="Gautami"/>
+        <a:font script="Taml" typeface="Latha"/>
+        <a:font script="Syrc" typeface="Estrangelo Edessa"/>
+        <a:font script="Orya" typeface="Kalinga"/>
+        <a:font script="Mlym" typeface="Kartika"/>
+        <a:font script="Laoo" typeface="DokChampa"/>
+        <a:font script="Sinh" typeface="Iskoola Pota"/>
+        <a:font script="Mong" typeface="Mongolian Baiti"/>
+        <a:font script="Viet" typeface="Times New Roman"/>
+        <a:font script="Uigh" typeface="Microsoft Uighur"/>
+        <a:font script="Geor" typeface="Sylfaen"/>
+        <a:font script="Armn" typeface="Arial"/>
+        <a:font script="Bugi" typeface="Leelawadee UI"/>
+        <a:font script="Bopo" typeface="Microsoft JhengHei"/>
+        <a:font script="Java" typeface="Javanese Text"/>
+        <a:font script="Lisu" typeface="Segoe UI"/>
+        <a:font script="Mymr" typeface="Myanmar Text"/>
+        <a:font script="Nkoo" typeface="Ebrima"/>
+        <a:font script="Olck" typeface="Nirmala UI"/>
+        <a:font script="Osma" typeface="Ebrima"/>
+        <a:font script="Phag" typeface="Phagspa"/>
+        <a:font script="Syrn" typeface="Estrangelo Edessa"/>
+        <a:font script="Syrj" typeface="Estrangelo Edessa"/>
+        <a:font script="Syre" typeface="Estrangelo Edessa"/>
+        <a:font script="Sora" typeface="Nirmala UI"/>
+        <a:font script="Tale" typeface="Microsoft Tai Le"/>
+        <a:font script="Talu" typeface="Microsoft New Tai Lue"/>
+        <a:font script="Tfng" typeface="Ebrima"/>
+      </a:majorFont>
+      <a:minorFont>
+        <a:latin typeface="等线" panose="020F0502020204030204"/>
+        <a:ea typeface=""/>
+        <a:cs typeface=""/>
+        <a:font script="Jpan" typeface="游ゴシック"/>
+        <a:font script="Hang" typeface="맑은 고딕"/>
+        <a:font script="Hans" typeface="等线"/>
+        <a:font script="Hant" typeface="新細明體"/>
+        <a:font script="Arab" typeface="Arial"/>
+        <a:font script="Hebr" typeface="Arial"/>
+        <a:font script="Thai" typeface="Cordia New"/>
+        <a:font script="Ethi" typeface="Nyala"/>
+        <a:font script="Beng" typeface="Vrinda"/>
+        <a:font script="Gujr" typeface="Shruti"/>
+        <a:font script="Khmr" typeface="DaunPenh"/>
+        <a:font script="Knda" typeface="Tunga"/>
+        <a:font script="Guru" typeface="Raavi"/>
+        <a:font script="Cans" typeface="Euphemia"/>
+        <a:font script="Cher" typeface="Plantagenet Cherokee"/>
+        <a:font script="Yiii" typeface="Microsoft Yi Baiti"/>
+        <a:font script="Tibt" typeface="Microsoft Himalaya"/>
+        <a:font script="Thaa" typeface="MV Boli"/>
+        <a:font script="Deva" typeface="Mangal"/>
+        <a:font script="Telu" typeface="Gautami"/>
+        <a:font script="Taml" typeface="Latha"/>
+        <a:font script="Syrc" typeface="Estrangelo Edessa"/>
+        <a:font script="Orya" typeface="Kalinga"/>
+        <a:font script="Mlym" typeface="Kartika"/>
+        <a:font script="Laoo" typeface="DokChampa"/>
+        <a:font script="Sinh" typeface="Iskoola Pota"/>
+        <a:font script="Mong" typeface="Mongolian Baiti"/>
+        <a:font script="Viet" typeface="Arial"/>
+        <a:font script="Uigh" typeface="Microsoft Uighur"/>
+        <a:font script="Geor" typeface="Sylfaen"/>
+        <a:font script="Armn" typeface="Arial"/>
+        <a:font script="Bugi" typeface="Leelawadee UI"/>
+        <a:font script="Bopo" typeface="Microsoft JhengHei"/>
+        <a:font script="Java" typeface="Javanese Text"/>
+        <a:font script="Lisu" typeface="Segoe UI"/>
+        <a:font script="Mymr" typeface="Myanmar Text"/>
+        <a:font script="Nkoo" typeface="Ebrima"/>
+        <a:font script="Olck" typeface="Nirmala UI"/>
+        <a:font script="Osma" typeface="Ebrima"/>
+        <a:font script="Phag" typeface="Phagspa"/>
+        <a:font script="Syrn" typeface="Estrangelo Edessa"/>
+        <a:font script="Syrj" typeface="Estrangelo Edessa"/>
+        <a:font script="Syre" typeface="Estrangelo Edessa"/>
+        <a:font script="Sora" typeface="Nirmala UI"/>
+        <a:font script="Tale" typeface="Microsoft Tai Le"/>
+        <a:font script="Talu" typeface="Microsoft New Tai Lue"/>
+        <a:font script="Tfng" typeface="Ebrima"/>
+      </a:minorFont>
+    </a:fontScheme>
+    <a:fmtScheme name="Office">
+      <a:fillStyleLst>
+        <a:solidFill>
+          <a:schemeClr val="phClr"/>
+        </a:solidFill>
+        <a:gradFill rotWithShape="1">
+          <a:gsLst>
+            <a:gs pos="0">
+              <a:schemeClr val="phClr">
+                <a:lumMod val="110000"/>
+                <a:satMod val="105000"/>
+                <a:tint val="67000"/>
+              </a:schemeClr>
+            </a:gs>
+            <a:gs pos="50000">
+              <a:schemeClr val="phClr">
+                <a:lumMod val="105000"/>
+                <a:satMod val="103000"/>
+                <a:tint val="73000"/>
+              </a:schemeClr>
+            </a:gs>
+            <a:gs pos="100000">
+              <a:schemeClr val="phClr">
+                <a:lumMod val="105000"/>
+                <a:satMod val="109000"/>
+                <a:tint val="81000"/>
+              </a:schemeClr>
+            </a:gs>
+          </a:gsLst>
+          <a:lin ang="5400000" scaled="0"/>
+        </a:gradFill>
+        <a:gradFill rotWithShape="1">
+          <a:gsLst>
+            <a:gs pos="0">
+              <a:schemeClr val="phClr">
+                <a:satMod val="103000"/>
+                <a:lumMod val="102000"/>
+                <a:tint val="94000"/>
+              </a:schemeClr>
+            </a:gs>
+            <a:gs pos="50000">
+              <a:schemeClr val="phClr">
+                <a:satMod val="110000"/>
+                <a:lumMod val="100000"/>
+                <a:shade val="100000"/>
+              </a:schemeClr>
+            </a:gs>
+            <a:gs pos="100000">
+              <a:schemeClr val="phClr">
+                <a:lumMod val="99000"/>
+                <a:satMod val="120000"/>
+                <a:shade val="78000"/>
+              </a:schemeClr>
+            </a:gs>
+          </a:gsLst>
+          <a:lin ang="5400000" scaled="0"/>
+        </a:gradFill>
+      </a:fillStyleLst>
+      <a:lnStyleLst>
+        <a:ln w="6350" cap="flat" cmpd="sng" algn="ctr">
+          <a:solidFill>
+            <a:schemeClr val="phClr"/>
+          </a:solidFill>
+          <a:prstDash val="solid"/>
+          <a:miter lim="800000"/>
+        </a:ln>
+        <a:ln w="12700" cap="flat" cmpd="sng" algn="ctr">
+          <a:solidFill>
+            <a:schemeClr val="phClr"/>
+          </a:solidFill>
+          <a:prstDash val="solid"/>
+          <a:miter lim="800000"/>
+        </a:ln>
+        <a:ln w="19050" cap="flat" cmpd="sng" algn="ctr">
+          <a:solidFill>
+            <a:schemeClr val="phClr"/>
+          </a:solidFill>
+          <a:prstDash val="solid"/>
+          <a:miter lim="800000"/>
+        </a:ln>
+      </a:lnStyleLst>
+      <a:effectStyleLst>
+        <a:effectStyle>
+          <a:effectLst/>
+        </a:effectStyle>
+        <a:effectStyle>
+          <a:effectLst/>
+        </a:effectStyle>
+        <a:effectStyle>
+          <a:effectLst>
+            <a:outerShdw blurRad="57150" dist="19050" dir="5400000" algn="ctr" rotWithShape="0">
+              <a:srgbClr val="000000">
+                <a:alpha val="63000"/>
+              </a:srgbClr>
+            </a:outerShdw>
+          </a:effectLst>
+        </a:effectStyle>
+      </a:effectStyleLst>
+      <a:bgFillStyleLst>
+        <a:solidFill>
+          <a:schemeClr val="phClr"/>
+        </a:solidFill>
+        <a:solidFill>
+          <a:schemeClr val="phClr">
+            <a:tint val="95000"/>
+            <a:satMod val="170000"/>
+          </a:schemeClr>
+        </a:solidFill>
+        <a:gradFill rotWithShape="1">
+          <a:gsLst>
+            <a:gs pos="0">
+              <a:schemeClr val="phClr">
+                <a:tint val="93000"/>
+                <a:satMod val="150000"/>
+                <a:shade val="98000"/>
+                <a:lumMod val="102000"/>
+              </a:schemeClr>
+            </a:gs>
+            <a:gs pos="50000">
+              <a:schemeClr val="phClr">
+                <a:tint val="98000"/>
+                <a:satMod val="130000"/>
+                <a:shade val="90000"/>
+                <a:lumMod val="103000"/>
+              </a:schemeClr>
+            </a:gs>
+            <a:gs pos="100000">
+              <a:schemeClr val="phClr">
+                <a:shade val="63000"/>
+                <a:satMod val="120000"/>
+              </a:schemeClr>
+            </a:gs>
+          </a:gsLst>
+          <a:lin ang="5400000" scaled="0"/>
+        </a:gradFill>
+      </a:bgFillStyleLst>
+    </a:fmtScheme>
+  </a:themeElements>
+  <a:objectDefaults/>
+  <a:extraClrSchemeLst/>
+  <a:extLst>
+    <a:ext uri="{05A4C25C-085E-4340-85A3-A5531E510DB2}">
+      <thm15:themeFamily xmlns:thm15="http://schemas.microsoft.com/office/thememl/2012/main" name="Office Theme" id="{62F939B6-93AF-4DB8-9C6B-D6C7DFDC589F}" vid="{4A3C46E8-61CC-4603-A589-7422A47A8E4A}"/>
+    </a:ext>
+  </a:extLst>
+</a:theme>
 </file>
</xml_diff>